<commit_message>
Add presentation, more implementation details
</commit_message>
<xml_diff>
--- a/microservices-in-practice.pptx
+++ b/microservices-in-practice.pptx
@@ -10,6 +10,10 @@
   <p:sldIdLst>
     <p:sldId id="256" r:id="rId8"/>
     <p:sldId id="257" r:id="rId9"/>
+    <p:sldId id="258" r:id="rId10"/>
+    <p:sldId id="259" r:id="rId11"/>
+    <p:sldId id="260" r:id="rId12"/>
+    <p:sldId id="261" r:id="rId13"/>
   </p:sldIdLst>
   <p:sldSz cx="24384000" cy="13716000"/>
   <p:notesSz cx="6858000" cy="9144000"/>
@@ -4353,7 +4357,7 @@
       </p:grpSpPr>
       <p:sp>
         <p:nvSpPr>
-          <p:cNvPr id="155" name="Slide Title"/>
+          <p:cNvPr id="155" name="Što su mikroservisi?"/>
           <p:cNvSpPr txBox="1"/>
           <p:nvPr>
             <p:ph type="title"/>
@@ -4369,6 +4373,9 @@
           <a:lstStyle/>
           <a:p>
             <a:pPr/>
+            <a:r>
+              <a:t>Što su mikroservisi?</a:t>
+            </a:r>
           </a:p>
         </p:txBody>
       </p:sp>
@@ -4395,7 +4402,536 @@
       </p:sp>
       <p:sp>
         <p:nvSpPr>
-          <p:cNvPr id="157" name="Slide bullet text"/>
+          <p:cNvPr id="157" name="Mikroservisi su stil softverske arhitekture u kojoj je aplikacija sastavljena od malih, neovisnih servisa koji komuniciraju putem jasno definiranih API-ja. Svaki servis odgovoran je za određenu poslovnu sposobnost ili funkciju."/>
+          <p:cNvSpPr txBox="1"/>
+          <p:nvPr>
+            <p:ph type="body" idx="1"/>
+          </p:nvPr>
+        </p:nvSpPr>
+        <p:spPr>
+          <a:prstGeom prst="rect">
+            <a:avLst/>
+          </a:prstGeom>
+        </p:spPr>
+        <p:txBody>
+          <a:bodyPr/>
+          <a:lstStyle/>
+          <a:p>
+            <a:pPr/>
+            <a:r>
+              <a:t>Mikroservisi su stil softverske arhitekture u kojoj je aplikacija sastavljena od malih, neovisnih servisa koji komuniciraju putem jasno definiranih API-ja. Svaki servis odgovoran je za određenu poslovnu sposobnost ili funkciju.</a:t>
+            </a:r>
+          </a:p>
+        </p:txBody>
+      </p:sp>
+    </p:spTree>
+  </p:cSld>
+  <p:clrMapOvr>
+    <a:masterClrMapping/>
+  </p:clrMapOvr>
+  <p:transition xmlns:p14="http://schemas.microsoft.com/office/powerpoint/2010/main" spd="med" advClick="1"/>
+</p:sld>
+</file>
+
+<file path=ppt/slides/slide3.xml><?xml version="1.0" encoding="utf-8"?>
+<p:sld xmlns:a="http://schemas.openxmlformats.org/drawingml/2006/main" xmlns:r="http://schemas.openxmlformats.org/officeDocument/2006/relationships" xmlns:p="http://schemas.openxmlformats.org/presentationml/2006/main" xmlns:m="http://schemas.openxmlformats.org/officeDocument/2006/math" xmlns:a14="http://schemas.microsoft.com/office/drawing/2010/main" showMasterSp="1" showMasterPhAnim="1">
+  <p:cSld>
+    <p:spTree>
+      <p:nvGrpSpPr>
+        <p:cNvPr id="1" name=""/>
+        <p:cNvGrpSpPr/>
+        <p:nvPr/>
+      </p:nvGrpSpPr>
+      <p:grpSpPr>
+        <a:xfrm>
+          <a:off x="0" y="0"/>
+          <a:ext cx="0" cy="0"/>
+          <a:chOff x="0" y="0"/>
+          <a:chExt cx="0" cy="0"/>
+        </a:xfrm>
+      </p:grpSpPr>
+      <p:sp>
+        <p:nvSpPr>
+          <p:cNvPr id="159" name="Ključne karakteristike mikroservisa"/>
+          <p:cNvSpPr txBox="1"/>
+          <p:nvPr>
+            <p:ph type="title"/>
+          </p:nvPr>
+        </p:nvSpPr>
+        <p:spPr>
+          <a:prstGeom prst="rect">
+            <a:avLst/>
+          </a:prstGeom>
+        </p:spPr>
+        <p:txBody>
+          <a:bodyPr/>
+          <a:lstStyle/>
+          <a:p>
+            <a:pPr/>
+            <a:r>
+              <a:t>Ključne karakteristike mikroservisa</a:t>
+            </a:r>
+          </a:p>
+        </p:txBody>
+      </p:sp>
+      <p:sp>
+        <p:nvSpPr>
+          <p:cNvPr id="160" name="Slide Subtitle"/>
+          <p:cNvSpPr txBox="1"/>
+          <p:nvPr>
+            <p:ph type="body" idx="21"/>
+          </p:nvPr>
+        </p:nvSpPr>
+        <p:spPr>
+          <a:prstGeom prst="rect">
+            <a:avLst/>
+          </a:prstGeom>
+        </p:spPr>
+        <p:txBody>
+          <a:bodyPr/>
+          <a:lstStyle/>
+          <a:p>
+            <a:pPr/>
+          </a:p>
+        </p:txBody>
+      </p:sp>
+      <p:sp>
+        <p:nvSpPr>
+          <p:cNvPr id="161" name="Dekompozicija - Mikroservisi razlažu kompleksne aplikacije na manje, upravljive servise. Svaki servis fokusira se na određenu poslovnu domenu ili funkcionalnost.…"/>
+          <p:cNvSpPr txBox="1"/>
+          <p:nvPr>
+            <p:ph type="body" idx="1"/>
+          </p:nvPr>
+        </p:nvSpPr>
+        <p:spPr>
+          <a:xfrm>
+            <a:off x="1045469" y="3167001"/>
+            <a:ext cx="21844001" cy="8432801"/>
+          </a:xfrm>
+          <a:prstGeom prst="rect">
+            <a:avLst/>
+          </a:prstGeom>
+        </p:spPr>
+        <p:txBody>
+          <a:bodyPr/>
+          <a:lstStyle/>
+          <a:p>
+            <a:pPr marL="525272" indent="-525272" defTabSz="2292095">
+              <a:spcBef>
+                <a:spcPts val="2200"/>
+              </a:spcBef>
+              <a:defRPr sz="4512"/>
+            </a:pPr>
+            <a:r>
+              <a:t>Dekompozicija - Mikroservisi razlažu kompleksne aplikacije na manje, upravljive servise. Svaki servis fokusira se na određenu poslovnu domenu ili funkcionalnost. </a:t>
+            </a:r>
+          </a:p>
+          <a:p>
+            <a:pPr marL="525272" indent="-525272" defTabSz="2292095">
+              <a:spcBef>
+                <a:spcPts val="2200"/>
+              </a:spcBef>
+              <a:defRPr sz="4512"/>
+            </a:pPr>
+            <a:r>
+              <a:t>Komunikacija putem jasnih ugovora (API-ja) - Servisi komuniciraju putem API-ja, obično putem HTTP-a ili koristeći protokole za razmjenu poruka kao što su MQTT ili AMQP.</a:t>
+            </a:r>
+          </a:p>
+          <a:p>
+            <a:pPr marL="525272" indent="-525272" defTabSz="2292095">
+              <a:spcBef>
+                <a:spcPts val="2200"/>
+              </a:spcBef>
+              <a:defRPr sz="4512"/>
+            </a:pPr>
+            <a:r>
+              <a:t>Upravljanje podacima - Konzistentnost i sinkronizacija podataka postaju izazovi</a:t>
+            </a:r>
+          </a:p>
+          <a:p>
+            <a:pPr marL="525272" indent="-525272" defTabSz="2292095">
+              <a:spcBef>
+                <a:spcPts val="2200"/>
+              </a:spcBef>
+              <a:defRPr sz="4512"/>
+            </a:pPr>
+            <a:r>
+              <a:t>Neovisnost - svaki mikroservis je neovisna cjelina, obično neko poslovno područje aplikacije</a:t>
+            </a:r>
+          </a:p>
+        </p:txBody>
+      </p:sp>
+    </p:spTree>
+  </p:cSld>
+  <p:clrMapOvr>
+    <a:masterClrMapping/>
+  </p:clrMapOvr>
+  <p:transition xmlns:p14="http://schemas.microsoft.com/office/powerpoint/2010/main" spd="med" advClick="1"/>
+</p:sld>
+</file>
+
+<file path=ppt/slides/slide4.xml><?xml version="1.0" encoding="utf-8"?>
+<p:sld xmlns:a="http://schemas.openxmlformats.org/drawingml/2006/main" xmlns:r="http://schemas.openxmlformats.org/officeDocument/2006/relationships" xmlns:p="http://schemas.openxmlformats.org/presentationml/2006/main" xmlns:m="http://schemas.openxmlformats.org/officeDocument/2006/math" xmlns:a14="http://schemas.microsoft.com/office/drawing/2010/main" showMasterSp="1" showMasterPhAnim="1">
+  <p:cSld>
+    <p:spTree>
+      <p:nvGrpSpPr>
+        <p:cNvPr id="1" name=""/>
+        <p:cNvGrpSpPr/>
+        <p:nvPr/>
+      </p:nvGrpSpPr>
+      <p:grpSpPr>
+        <a:xfrm>
+          <a:off x="0" y="0"/>
+          <a:ext cx="0" cy="0"/>
+          <a:chOff x="0" y="0"/>
+          <a:chExt cx="0" cy="0"/>
+        </a:xfrm>
+      </p:grpSpPr>
+      <p:sp>
+        <p:nvSpPr>
+          <p:cNvPr id="163" name="Korisni linkovi"/>
+          <p:cNvSpPr txBox="1"/>
+          <p:nvPr>
+            <p:ph type="title"/>
+          </p:nvPr>
+        </p:nvSpPr>
+        <p:spPr>
+          <a:prstGeom prst="rect">
+            <a:avLst/>
+          </a:prstGeom>
+        </p:spPr>
+        <p:txBody>
+          <a:bodyPr/>
+          <a:lstStyle/>
+          <a:p>
+            <a:pPr/>
+            <a:r>
+              <a:t>Korisni linkovi</a:t>
+            </a:r>
+          </a:p>
+        </p:txBody>
+      </p:sp>
+      <p:sp>
+        <p:nvSpPr>
+          <p:cNvPr id="164" name="Slide Subtitle"/>
+          <p:cNvSpPr txBox="1"/>
+          <p:nvPr>
+            <p:ph type="body" idx="21"/>
+          </p:nvPr>
+        </p:nvSpPr>
+        <p:spPr>
+          <a:prstGeom prst="rect">
+            <a:avLst/>
+          </a:prstGeom>
+        </p:spPr>
+        <p:txBody>
+          <a:bodyPr/>
+          <a:lstStyle/>
+          <a:p>
+            <a:pPr/>
+          </a:p>
+        </p:txBody>
+      </p:sp>
+      <p:sp>
+        <p:nvSpPr>
+          <p:cNvPr id="165" name="https://kubernetes.io/ (Kubernetes, platforma za pokretanje mikroservisa)…"/>
+          <p:cNvSpPr txBox="1"/>
+          <p:nvPr>
+            <p:ph type="body" idx="1"/>
+          </p:nvPr>
+        </p:nvSpPr>
+        <p:spPr>
+          <a:prstGeom prst="rect">
+            <a:avLst/>
+          </a:prstGeom>
+        </p:spPr>
+        <p:txBody>
+          <a:bodyPr/>
+          <a:lstStyle/>
+          <a:p>
+            <a:pPr marL="502919" indent="-502919" defTabSz="2194559">
+              <a:spcBef>
+                <a:spcPts val="2100"/>
+              </a:spcBef>
+              <a:defRPr sz="4319"/>
+            </a:pPr>
+            <a:r>
+              <a:rPr u="sng">
+                <a:hlinkClick r:id="rId2" invalidUrl="" action="" tgtFrame="" tooltip="" history="1" highlightClick="0" endSnd="0"/>
+              </a:rPr>
+              <a:t>https://kubernetes.io/</a:t>
+            </a:r>
+            <a:r>
+              <a:t> (Kubernetes, platforma za pokretanje mikroservisa)</a:t>
+            </a:r>
+          </a:p>
+          <a:p>
+            <a:pPr marL="502919" indent="-502919" defTabSz="2194559">
+              <a:spcBef>
+                <a:spcPts val="2100"/>
+              </a:spcBef>
+              <a:defRPr sz="4319"/>
+            </a:pPr>
+            <a:r>
+              <a:rPr u="sng">
+                <a:hlinkClick r:id="rId3" invalidUrl="" action="" tgtFrame="" tooltip="" history="1" highlightClick="0" endSnd="0"/>
+              </a:rPr>
+              <a:t>https://artifacthub.io/</a:t>
+            </a:r>
+            <a:r>
+              <a:t> (Helm chartovi)</a:t>
+            </a:r>
+          </a:p>
+          <a:p>
+            <a:pPr marL="502919" indent="-502919" defTabSz="2194559">
+              <a:spcBef>
+                <a:spcPts val="2100"/>
+              </a:spcBef>
+              <a:defRPr sz="4319"/>
+            </a:pPr>
+            <a:r>
+              <a:rPr u="sng">
+                <a:hlinkClick r:id="rId4" invalidUrl="" action="" tgtFrame="" tooltip="" history="1" highlightClick="0" endSnd="0"/>
+              </a:rPr>
+              <a:t>https://nx.dev/</a:t>
+            </a:r>
+            <a:r>
+              <a:t> (Frontend /microfrontend monorepo tool)</a:t>
+            </a:r>
+          </a:p>
+          <a:p>
+            <a:pPr marL="502919" indent="-502919" defTabSz="2194559">
+              <a:spcBef>
+                <a:spcPts val="2100"/>
+              </a:spcBef>
+              <a:defRPr sz="4319"/>
+            </a:pPr>
+            <a:r>
+              <a:t>https://rancherdesktop.io/  (Rancher Desktop, za lokalni Docker/Kubernetes)</a:t>
+            </a:r>
+          </a:p>
+          <a:p>
+            <a:pPr marL="502919" indent="-502919" defTabSz="2194559">
+              <a:spcBef>
+                <a:spcPts val="2100"/>
+              </a:spcBef>
+              <a:defRPr sz="4319"/>
+            </a:pPr>
+            <a:r>
+              <a:rPr u="sng">
+                <a:hlinkClick r:id="rId5" invalidUrl="" action="" tgtFrame="" tooltip="" history="1" highlightClick="0" endSnd="0"/>
+              </a:rPr>
+              <a:t>https://github.com/npongracic/tech43-microservices-in-practice</a:t>
+            </a:r>
+            <a:r>
+              <a:t> (ovaj workhshop)</a:t>
+            </a:r>
+          </a:p>
+          <a:p>
+            <a:pPr marL="502919" indent="-502919" defTabSz="2194559">
+              <a:spcBef>
+                <a:spcPts val="2100"/>
+              </a:spcBef>
+              <a:defRPr sz="4319"/>
+            </a:pPr>
+            <a:r>
+              <a:rPr u="sng">
+                <a:hlinkClick r:id="rId6" invalidUrl="" action="" tgtFrame="" tooltip="" history="1" highlightClick="0" endSnd="0"/>
+              </a:rPr>
+              <a:t>https://helm.sh/docs/intro/quickstart/</a:t>
+            </a:r>
+            <a:r>
+              <a:t> (Helm, package manager za Kubernetes)</a:t>
+            </a:r>
+          </a:p>
+          <a:p>
+            <a:pPr marL="502919" indent="-502919" defTabSz="2194559">
+              <a:spcBef>
+                <a:spcPts val="2100"/>
+              </a:spcBef>
+              <a:defRPr sz="4319"/>
+            </a:pPr>
+            <a:r>
+              <a:rPr u="sng">
+                <a:hlinkClick r:id="rId7" invalidUrl="" action="" tgtFrame="" tooltip="" history="1" highlightClick="0" endSnd="0"/>
+              </a:rPr>
+              <a:t>https://docs.dapr.io/</a:t>
+            </a:r>
+            <a:r>
+              <a:t> (Distributed Application Runtime, korisne komponente koje olakšavaju donedavno teške probleme kao što su pub/sub, sinkronizacija stanja i sl.)</a:t>
+            </a:r>
+          </a:p>
+        </p:txBody>
+      </p:sp>
+    </p:spTree>
+  </p:cSld>
+  <p:clrMapOvr>
+    <a:masterClrMapping/>
+  </p:clrMapOvr>
+  <p:transition xmlns:p14="http://schemas.microsoft.com/office/powerpoint/2010/main" spd="med" advClick="1"/>
+</p:sld>
+</file>
+
+<file path=ppt/slides/slide5.xml><?xml version="1.0" encoding="utf-8"?>
+<p:sld xmlns:a="http://schemas.openxmlformats.org/drawingml/2006/main" xmlns:r="http://schemas.openxmlformats.org/officeDocument/2006/relationships" xmlns:p="http://schemas.openxmlformats.org/presentationml/2006/main" xmlns:m="http://schemas.openxmlformats.org/officeDocument/2006/math" xmlns:a14="http://schemas.microsoft.com/office/drawing/2010/main" showMasterSp="1" showMasterPhAnim="1">
+  <p:cSld>
+    <p:spTree>
+      <p:nvGrpSpPr>
+        <p:cNvPr id="1" name=""/>
+        <p:cNvGrpSpPr/>
+        <p:nvPr/>
+      </p:nvGrpSpPr>
+      <p:grpSpPr>
+        <a:xfrm>
+          <a:off x="0" y="0"/>
+          <a:ext cx="0" cy="0"/>
+          <a:chOff x="0" y="0"/>
+          <a:chExt cx="0" cy="0"/>
+        </a:xfrm>
+      </p:grpSpPr>
+      <p:sp>
+        <p:nvSpPr>
+          <p:cNvPr id="167" name="Workshop"/>
+          <p:cNvSpPr txBox="1"/>
+          <p:nvPr>
+            <p:ph type="title"/>
+          </p:nvPr>
+        </p:nvSpPr>
+        <p:spPr>
+          <a:prstGeom prst="rect">
+            <a:avLst/>
+          </a:prstGeom>
+        </p:spPr>
+        <p:txBody>
+          <a:bodyPr/>
+          <a:lstStyle/>
+          <a:p>
+            <a:pPr/>
+            <a:r>
+              <a:t>Workshop</a:t>
+            </a:r>
+          </a:p>
+        </p:txBody>
+      </p:sp>
+      <p:sp>
+        <p:nvSpPr>
+          <p:cNvPr id="168" name="Slide Subtitle"/>
+          <p:cNvSpPr txBox="1"/>
+          <p:nvPr>
+            <p:ph type="body" idx="21"/>
+          </p:nvPr>
+        </p:nvSpPr>
+        <p:spPr>
+          <a:prstGeom prst="rect">
+            <a:avLst/>
+          </a:prstGeom>
+        </p:spPr>
+        <p:txBody>
+          <a:bodyPr/>
+          <a:lstStyle/>
+          <a:p>
+            <a:pPr/>
+          </a:p>
+        </p:txBody>
+      </p:sp>
+      <p:sp>
+        <p:nvSpPr>
+          <p:cNvPr id="169" name="Demo time"/>
+          <p:cNvSpPr txBox="1"/>
+          <p:nvPr>
+            <p:ph type="body" idx="1"/>
+          </p:nvPr>
+        </p:nvSpPr>
+        <p:spPr>
+          <a:prstGeom prst="rect">
+            <a:avLst/>
+          </a:prstGeom>
+        </p:spPr>
+        <p:txBody>
+          <a:bodyPr/>
+          <a:lstStyle/>
+          <a:p>
+            <a:pPr/>
+            <a:r>
+              <a:t>Demo time</a:t>
+            </a:r>
+          </a:p>
+        </p:txBody>
+      </p:sp>
+    </p:spTree>
+  </p:cSld>
+  <p:clrMapOvr>
+    <a:masterClrMapping/>
+  </p:clrMapOvr>
+  <p:transition xmlns:p14="http://schemas.microsoft.com/office/powerpoint/2010/main" spd="med" advClick="1"/>
+</p:sld>
+</file>
+
+<file path=ppt/slides/slide6.xml><?xml version="1.0" encoding="utf-8"?>
+<p:sld xmlns:a="http://schemas.openxmlformats.org/drawingml/2006/main" xmlns:r="http://schemas.openxmlformats.org/officeDocument/2006/relationships" xmlns:p="http://schemas.openxmlformats.org/presentationml/2006/main" xmlns:m="http://schemas.openxmlformats.org/officeDocument/2006/math" xmlns:a14="http://schemas.microsoft.com/office/drawing/2010/main" showMasterSp="1" showMasterPhAnim="1">
+  <p:cSld>
+    <p:spTree>
+      <p:nvGrpSpPr>
+        <p:cNvPr id="1" name=""/>
+        <p:cNvGrpSpPr/>
+        <p:nvPr/>
+      </p:nvGrpSpPr>
+      <p:grpSpPr>
+        <a:xfrm>
+          <a:off x="0" y="0"/>
+          <a:ext cx="0" cy="0"/>
+          <a:chOff x="0" y="0"/>
+          <a:chExt cx="0" cy="0"/>
+        </a:xfrm>
+      </p:grpSpPr>
+      <p:sp>
+        <p:nvSpPr>
+          <p:cNvPr id="171" name="Hvala!"/>
+          <p:cNvSpPr txBox="1"/>
+          <p:nvPr>
+            <p:ph type="title"/>
+          </p:nvPr>
+        </p:nvSpPr>
+        <p:spPr>
+          <a:prstGeom prst="rect">
+            <a:avLst/>
+          </a:prstGeom>
+        </p:spPr>
+        <p:txBody>
+          <a:bodyPr/>
+          <a:lstStyle/>
+          <a:p>
+            <a:pPr/>
+            <a:r>
+              <a:t>Hvala!</a:t>
+            </a:r>
+          </a:p>
+        </p:txBody>
+      </p:sp>
+      <p:sp>
+        <p:nvSpPr>
+          <p:cNvPr id="172" name="Slide Subtitle"/>
+          <p:cNvSpPr txBox="1"/>
+          <p:nvPr>
+            <p:ph type="body" idx="21"/>
+          </p:nvPr>
+        </p:nvSpPr>
+        <p:spPr>
+          <a:prstGeom prst="rect">
+            <a:avLst/>
+          </a:prstGeom>
+        </p:spPr>
+        <p:txBody>
+          <a:bodyPr/>
+          <a:lstStyle/>
+          <a:p>
+            <a:pPr/>
+          </a:p>
+        </p:txBody>
+      </p:sp>
+      <p:sp>
+        <p:nvSpPr>
+          <p:cNvPr id="173" name="Slide bullet text"/>
           <p:cNvSpPr txBox="1"/>
           <p:nvPr>
             <p:ph type="body" idx="1"/>

</xml_diff>